<commit_message>
addressing comments from Asokan
</commit_message>
<xml_diff>
--- a/figures/bpf-overview.pptx
+++ b/figures/bpf-overview.pptx
@@ -197,7 +197,7 @@
           <a:p>
             <a:fld id="{7982631F-149A-4439-93E3-D983C1096BF0}" type="datetimeFigureOut">
               <a:rPr lang="fi-FI" smtClean="0"/>
-              <a:t>6.3.2018</a:t>
+              <a:t>23.3.2018</a:t>
             </a:fld>
             <a:endParaRPr lang="fi-FI"/>
           </a:p>
@@ -680,7 +680,7 @@
           <a:p>
             <a:fld id="{7F5FED34-BF48-4C0A-8D6B-0E5DDAAE4C76}" type="datetimeFigureOut">
               <a:rPr lang="fi-FI" smtClean="0"/>
-              <a:t>6.3.2018</a:t>
+              <a:t>23.3.2018</a:t>
             </a:fld>
             <a:endParaRPr lang="fi-FI"/>
           </a:p>
@@ -850,7 +850,7 @@
           <a:p>
             <a:fld id="{7F5FED34-BF48-4C0A-8D6B-0E5DDAAE4C76}" type="datetimeFigureOut">
               <a:rPr lang="fi-FI" smtClean="0"/>
-              <a:t>6.3.2018</a:t>
+              <a:t>23.3.2018</a:t>
             </a:fld>
             <a:endParaRPr lang="fi-FI"/>
           </a:p>
@@ -1030,7 +1030,7 @@
           <a:p>
             <a:fld id="{7F5FED34-BF48-4C0A-8D6B-0E5DDAAE4C76}" type="datetimeFigureOut">
               <a:rPr lang="fi-FI" smtClean="0"/>
-              <a:t>6.3.2018</a:t>
+              <a:t>23.3.2018</a:t>
             </a:fld>
             <a:endParaRPr lang="fi-FI"/>
           </a:p>
@@ -1200,7 +1200,7 @@
           <a:p>
             <a:fld id="{7F5FED34-BF48-4C0A-8D6B-0E5DDAAE4C76}" type="datetimeFigureOut">
               <a:rPr lang="fi-FI" smtClean="0"/>
-              <a:t>6.3.2018</a:t>
+              <a:t>23.3.2018</a:t>
             </a:fld>
             <a:endParaRPr lang="fi-FI"/>
           </a:p>
@@ -1446,7 +1446,7 @@
           <a:p>
             <a:fld id="{7F5FED34-BF48-4C0A-8D6B-0E5DDAAE4C76}" type="datetimeFigureOut">
               <a:rPr lang="fi-FI" smtClean="0"/>
-              <a:t>6.3.2018</a:t>
+              <a:t>23.3.2018</a:t>
             </a:fld>
             <a:endParaRPr lang="fi-FI"/>
           </a:p>
@@ -1678,7 +1678,7 @@
           <a:p>
             <a:fld id="{7F5FED34-BF48-4C0A-8D6B-0E5DDAAE4C76}" type="datetimeFigureOut">
               <a:rPr lang="fi-FI" smtClean="0"/>
-              <a:t>6.3.2018</a:t>
+              <a:t>23.3.2018</a:t>
             </a:fld>
             <a:endParaRPr lang="fi-FI"/>
           </a:p>
@@ -2045,7 +2045,7 @@
           <a:p>
             <a:fld id="{7F5FED34-BF48-4C0A-8D6B-0E5DDAAE4C76}" type="datetimeFigureOut">
               <a:rPr lang="fi-FI" smtClean="0"/>
-              <a:t>6.3.2018</a:t>
+              <a:t>23.3.2018</a:t>
             </a:fld>
             <a:endParaRPr lang="fi-FI"/>
           </a:p>
@@ -2163,7 +2163,7 @@
           <a:p>
             <a:fld id="{7F5FED34-BF48-4C0A-8D6B-0E5DDAAE4C76}" type="datetimeFigureOut">
               <a:rPr lang="fi-FI" smtClean="0"/>
-              <a:t>6.3.2018</a:t>
+              <a:t>23.3.2018</a:t>
             </a:fld>
             <a:endParaRPr lang="fi-FI"/>
           </a:p>
@@ -2258,7 +2258,7 @@
           <a:p>
             <a:fld id="{7F5FED34-BF48-4C0A-8D6B-0E5DDAAE4C76}" type="datetimeFigureOut">
               <a:rPr lang="fi-FI" smtClean="0"/>
-              <a:t>6.3.2018</a:t>
+              <a:t>23.3.2018</a:t>
             </a:fld>
             <a:endParaRPr lang="fi-FI"/>
           </a:p>
@@ -2535,7 +2535,7 @@
           <a:p>
             <a:fld id="{7F5FED34-BF48-4C0A-8D6B-0E5DDAAE4C76}" type="datetimeFigureOut">
               <a:rPr lang="fi-FI" smtClean="0"/>
-              <a:t>6.3.2018</a:t>
+              <a:t>23.3.2018</a:t>
             </a:fld>
             <a:endParaRPr lang="fi-FI"/>
           </a:p>
@@ -2788,7 +2788,7 @@
           <a:p>
             <a:fld id="{7F5FED34-BF48-4C0A-8D6B-0E5DDAAE4C76}" type="datetimeFigureOut">
               <a:rPr lang="fi-FI" smtClean="0"/>
-              <a:t>6.3.2018</a:t>
+              <a:t>23.3.2018</a:t>
             </a:fld>
             <a:endParaRPr lang="fi-FI"/>
           </a:p>
@@ -3001,7 +3001,7 @@
           <a:p>
             <a:fld id="{7F5FED34-BF48-4C0A-8D6B-0E5DDAAE4C76}" type="datetimeFigureOut">
               <a:rPr lang="fi-FI" smtClean="0"/>
-              <a:t>6.3.2018</a:t>
+              <a:t>23.3.2018</a:t>
             </a:fld>
             <a:endParaRPr lang="fi-FI"/>
           </a:p>
@@ -4294,7 +4294,7 @@
             <a:lstStyle/>
             <a:p>
               <a:r>
-                <a:rPr lang="fi-FI" sz="1600" dirty="0" smtClean="0"/>
+                <a:rPr lang="en-GB" sz="1600" dirty="0" smtClean="0"/>
                 <a:t>6.</a:t>
               </a:r>
               <a:endParaRPr lang="fi-FI" sz="1600" dirty="0"/>
@@ -4515,36 +4515,6 @@
               <a:r>
                 <a:rPr lang="fi-FI" sz="1600" dirty="0" smtClean="0"/>
                 <a:t>8.</a:t>
-              </a:r>
-              <a:endParaRPr lang="fi-FI" sz="1600" dirty="0"/>
-            </a:p>
-          </p:txBody>
-        </p:sp>
-        <p:sp>
-          <p:nvSpPr>
-            <p:cNvPr id="30" name="TextBox 29"/>
-            <p:cNvSpPr txBox="1"/>
-            <p:nvPr/>
-          </p:nvSpPr>
-          <p:spPr>
-            <a:xfrm>
-              <a:off x="6464969" y="3891965"/>
-              <a:ext cx="372424" cy="338554"/>
-            </a:xfrm>
-            <a:prstGeom prst="rect">
-              <a:avLst/>
-            </a:prstGeom>
-            <a:noFill/>
-          </p:spPr>
-          <p:txBody>
-            <a:bodyPr wrap="square" rtlCol="0">
-              <a:spAutoFit/>
-            </a:bodyPr>
-            <a:lstStyle/>
-            <a:p>
-              <a:r>
-                <a:rPr lang="fi-FI" sz="1600" dirty="0" smtClean="0"/>
-                <a:t>9.</a:t>
               </a:r>
               <a:endParaRPr lang="fi-FI" sz="1600" dirty="0"/>
             </a:p>

</xml_diff>

<commit_message>
addressing further comments from Alastair and Sven
</commit_message>
<xml_diff>
--- a/figures/bpf-overview.pptx
+++ b/figures/bpf-overview.pptx
@@ -197,7 +197,7 @@
           <a:p>
             <a:fld id="{7982631F-149A-4439-93E3-D983C1096BF0}" type="datetimeFigureOut">
               <a:rPr lang="fi-FI" smtClean="0"/>
-              <a:t>2.4.2018</a:t>
+              <a:t>31.5.2018</a:t>
             </a:fld>
             <a:endParaRPr lang="fi-FI"/>
           </a:p>
@@ -680,7 +680,7 @@
           <a:p>
             <a:fld id="{7F5FED34-BF48-4C0A-8D6B-0E5DDAAE4C76}" type="datetimeFigureOut">
               <a:rPr lang="fi-FI" smtClean="0"/>
-              <a:t>2.4.2018</a:t>
+              <a:t>31.5.2018</a:t>
             </a:fld>
             <a:endParaRPr lang="fi-FI"/>
           </a:p>
@@ -850,7 +850,7 @@
           <a:p>
             <a:fld id="{7F5FED34-BF48-4C0A-8D6B-0E5DDAAE4C76}" type="datetimeFigureOut">
               <a:rPr lang="fi-FI" smtClean="0"/>
-              <a:t>2.4.2018</a:t>
+              <a:t>31.5.2018</a:t>
             </a:fld>
             <a:endParaRPr lang="fi-FI"/>
           </a:p>
@@ -1030,7 +1030,7 @@
           <a:p>
             <a:fld id="{7F5FED34-BF48-4C0A-8D6B-0E5DDAAE4C76}" type="datetimeFigureOut">
               <a:rPr lang="fi-FI" smtClean="0"/>
-              <a:t>2.4.2018</a:t>
+              <a:t>31.5.2018</a:t>
             </a:fld>
             <a:endParaRPr lang="fi-FI"/>
           </a:p>
@@ -1200,7 +1200,7 @@
           <a:p>
             <a:fld id="{7F5FED34-BF48-4C0A-8D6B-0E5DDAAE4C76}" type="datetimeFigureOut">
               <a:rPr lang="fi-FI" smtClean="0"/>
-              <a:t>2.4.2018</a:t>
+              <a:t>31.5.2018</a:t>
             </a:fld>
             <a:endParaRPr lang="fi-FI"/>
           </a:p>
@@ -1446,7 +1446,7 @@
           <a:p>
             <a:fld id="{7F5FED34-BF48-4C0A-8D6B-0E5DDAAE4C76}" type="datetimeFigureOut">
               <a:rPr lang="fi-FI" smtClean="0"/>
-              <a:t>2.4.2018</a:t>
+              <a:t>31.5.2018</a:t>
             </a:fld>
             <a:endParaRPr lang="fi-FI"/>
           </a:p>
@@ -1678,7 +1678,7 @@
           <a:p>
             <a:fld id="{7F5FED34-BF48-4C0A-8D6B-0E5DDAAE4C76}" type="datetimeFigureOut">
               <a:rPr lang="fi-FI" smtClean="0"/>
-              <a:t>2.4.2018</a:t>
+              <a:t>31.5.2018</a:t>
             </a:fld>
             <a:endParaRPr lang="fi-FI"/>
           </a:p>
@@ -2045,7 +2045,7 @@
           <a:p>
             <a:fld id="{7F5FED34-BF48-4C0A-8D6B-0E5DDAAE4C76}" type="datetimeFigureOut">
               <a:rPr lang="fi-FI" smtClean="0"/>
-              <a:t>2.4.2018</a:t>
+              <a:t>31.5.2018</a:t>
             </a:fld>
             <a:endParaRPr lang="fi-FI"/>
           </a:p>
@@ -2163,7 +2163,7 @@
           <a:p>
             <a:fld id="{7F5FED34-BF48-4C0A-8D6B-0E5DDAAE4C76}" type="datetimeFigureOut">
               <a:rPr lang="fi-FI" smtClean="0"/>
-              <a:t>2.4.2018</a:t>
+              <a:t>31.5.2018</a:t>
             </a:fld>
             <a:endParaRPr lang="fi-FI"/>
           </a:p>
@@ -2258,7 +2258,7 @@
           <a:p>
             <a:fld id="{7F5FED34-BF48-4C0A-8D6B-0E5DDAAE4C76}" type="datetimeFigureOut">
               <a:rPr lang="fi-FI" smtClean="0"/>
-              <a:t>2.4.2018</a:t>
+              <a:t>31.5.2018</a:t>
             </a:fld>
             <a:endParaRPr lang="fi-FI"/>
           </a:p>
@@ -2535,7 +2535,7 @@
           <a:p>
             <a:fld id="{7F5FED34-BF48-4C0A-8D6B-0E5DDAAE4C76}" type="datetimeFigureOut">
               <a:rPr lang="fi-FI" smtClean="0"/>
-              <a:t>2.4.2018</a:t>
+              <a:t>31.5.2018</a:t>
             </a:fld>
             <a:endParaRPr lang="fi-FI"/>
           </a:p>
@@ -2788,7 +2788,7 @@
           <a:p>
             <a:fld id="{7F5FED34-BF48-4C0A-8D6B-0E5DDAAE4C76}" type="datetimeFigureOut">
               <a:rPr lang="fi-FI" smtClean="0"/>
-              <a:t>2.4.2018</a:t>
+              <a:t>31.5.2018</a:t>
             </a:fld>
             <a:endParaRPr lang="fi-FI"/>
           </a:p>
@@ -3001,7 +3001,7 @@
           <a:p>
             <a:fld id="{7F5FED34-BF48-4C0A-8D6B-0E5DDAAE4C76}" type="datetimeFigureOut">
               <a:rPr lang="fi-FI" smtClean="0"/>
-              <a:t>2.4.2018</a:t>
+              <a:t>31.5.2018</a:t>
             </a:fld>
             <a:endParaRPr lang="fi-FI"/>
           </a:p>
@@ -3414,10 +3414,10 @@
         </p:nvGrpSpPr>
         <p:grpSpPr>
           <a:xfrm>
-            <a:off x="829424" y="560832"/>
-            <a:ext cx="6936035" cy="5687014"/>
-            <a:chOff x="751786" y="1199186"/>
-            <a:chExt cx="6936035" cy="5687014"/>
+            <a:off x="829424" y="534742"/>
+            <a:ext cx="6936035" cy="5713103"/>
+            <a:chOff x="751786" y="1173097"/>
+            <a:chExt cx="6936035" cy="5713103"/>
           </a:xfrm>
         </p:grpSpPr>
         <p:sp>
@@ -3428,7 +3428,7 @@
           </p:nvSpPr>
           <p:spPr>
             <a:xfrm>
-              <a:off x="4450199" y="5294931"/>
+              <a:off x="5088545" y="5294931"/>
               <a:ext cx="1938216" cy="965405"/>
             </a:xfrm>
             <a:prstGeom prst="roundRect">
@@ -3651,7 +3651,7 @@
           </p:nvSpPr>
           <p:spPr>
             <a:xfrm>
-              <a:off x="2864263" y="2224619"/>
+              <a:off x="3399090" y="2224619"/>
               <a:ext cx="1464671" cy="583167"/>
             </a:xfrm>
             <a:prstGeom prst="ellipse">
@@ -3710,7 +3710,7 @@
           <p:spPr>
             <a:xfrm>
               <a:off x="2494861" y="1506903"/>
-              <a:ext cx="1101738" cy="717716"/>
+              <a:ext cx="1636565" cy="717716"/>
             </a:xfrm>
             <a:prstGeom prst="bentConnector2">
               <a:avLst/>
@@ -3745,7 +3745,7 @@
           </p:nvSpPr>
           <p:spPr>
             <a:xfrm>
-              <a:off x="3741059" y="1656416"/>
+              <a:off x="2888594" y="1173097"/>
               <a:ext cx="2535544" cy="338554"/>
             </a:xfrm>
             <a:prstGeom prst="rect">
@@ -3761,7 +3761,11 @@
             <a:p>
               <a:r>
                 <a:rPr lang="fi-FI" sz="1600" dirty="0" smtClean="0"/>
-                <a:t>2.</a:t>
+                <a:t>2</a:t>
+              </a:r>
+              <a:r>
+                <a:rPr lang="fi-FI" sz="1600" dirty="0" smtClean="0"/>
+                <a:t>. create</a:t>
               </a:r>
               <a:endParaRPr lang="fi-FI" sz="1600" dirty="0"/>
             </a:p>
@@ -3875,8 +3879,8 @@
           </p:nvSpPr>
           <p:spPr>
             <a:xfrm>
-              <a:off x="1726725" y="1834006"/>
-              <a:ext cx="352126" cy="338554"/>
+              <a:off x="1726724" y="1834006"/>
+              <a:ext cx="1007849" cy="338554"/>
             </a:xfrm>
             <a:prstGeom prst="rect">
               <a:avLst/>
@@ -3891,7 +3895,15 @@
             <a:p>
               <a:r>
                 <a:rPr lang="fi-FI" sz="1600" dirty="0" smtClean="0"/>
-                <a:t>1</a:t>
+                <a:t>1. </a:t>
+              </a:r>
+              <a:r>
+                <a:rPr lang="fi-FI" sz="1600" dirty="0"/>
+                <a:t>c</a:t>
+              </a:r>
+              <a:r>
+                <a:rPr lang="fi-FI" sz="1600" dirty="0" smtClean="0"/>
+                <a:t>reate</a:t>
               </a:r>
               <a:endParaRPr lang="fi-FI" sz="1200" dirty="0"/>
             </a:p>
@@ -3909,7 +3921,7 @@
           <p:spPr>
             <a:xfrm>
               <a:off x="2494860" y="2516202"/>
-              <a:ext cx="369403" cy="1"/>
+              <a:ext cx="904230" cy="1"/>
             </a:xfrm>
             <a:prstGeom prst="bentConnector3">
               <a:avLst>
@@ -3946,8 +3958,8 @@
           </p:nvSpPr>
           <p:spPr>
             <a:xfrm>
-              <a:off x="2532293" y="2124689"/>
-              <a:ext cx="453390" cy="338554"/>
+              <a:off x="2555662" y="2171277"/>
+              <a:ext cx="998283" cy="338554"/>
             </a:xfrm>
             <a:prstGeom prst="rect">
               <a:avLst/>
@@ -3962,7 +3974,11 @@
             <a:p>
               <a:r>
                 <a:rPr lang="fi-FI" sz="1600" dirty="0" smtClean="0"/>
-                <a:t>3.</a:t>
+                <a:t>3</a:t>
+              </a:r>
+              <a:r>
+                <a:rPr lang="fi-FI" sz="1600" dirty="0" smtClean="0"/>
+                <a:t>. attach</a:t>
               </a:r>
               <a:endParaRPr lang="fi-FI" sz="1600" dirty="0"/>
             </a:p>
@@ -4038,12 +4054,12 @@
           </p:nvCxnSpPr>
           <p:spPr>
             <a:xfrm rot="5400000">
-              <a:off x="1983233" y="2447876"/>
-              <a:ext cx="1253456" cy="1973276"/>
+              <a:off x="2250647" y="2180463"/>
+              <a:ext cx="1253456" cy="2508103"/>
             </a:xfrm>
             <a:prstGeom prst="bentConnector3">
               <a:avLst>
-                <a:gd name="adj1" fmla="val 23221"/>
+                <a:gd name="adj1" fmla="val 50000"/>
               </a:avLst>
             </a:prstGeom>
             <a:ln w="38100">
@@ -4076,8 +4092,8 @@
           </p:nvSpPr>
           <p:spPr>
             <a:xfrm>
-              <a:off x="1771499" y="3380155"/>
-              <a:ext cx="396844" cy="338554"/>
+              <a:off x="1595484" y="3457385"/>
+              <a:ext cx="3165330" cy="338554"/>
             </a:xfrm>
             <a:prstGeom prst="rect">
               <a:avLst/>
@@ -4092,7 +4108,11 @@
             <a:p>
               <a:r>
                 <a:rPr lang="fi-FI" sz="1600" dirty="0" smtClean="0"/>
-                <a:t>4.</a:t>
+                <a:t>4</a:t>
+              </a:r>
+              <a:r>
+                <a:rPr lang="fi-FI" sz="1600" dirty="0" smtClean="0"/>
+                <a:t>. load program to the kernel</a:t>
               </a:r>
               <a:endParaRPr lang="fi-FI" sz="1600" dirty="0"/>
             </a:p>
@@ -4211,8 +4231,8 @@
           </p:nvSpPr>
           <p:spPr>
             <a:xfrm>
-              <a:off x="1708763" y="5037738"/>
-              <a:ext cx="372784" cy="369332"/>
+              <a:off x="1601063" y="4744425"/>
+              <a:ext cx="2045259" cy="369332"/>
             </a:xfrm>
             <a:prstGeom prst="rect">
               <a:avLst/>
@@ -4227,9 +4247,21 @@
             <a:p>
               <a:r>
                 <a:rPr lang="fi-FI" dirty="0" smtClean="0"/>
-                <a:t>5.</a:t>
+                <a:t>5</a:t>
               </a:r>
-              <a:endParaRPr lang="fi-FI" dirty="0"/>
+              <a:r>
+                <a:rPr lang="fi-FI" dirty="0" smtClean="0"/>
+                <a:t>. </a:t>
+              </a:r>
+              <a:r>
+                <a:rPr lang="fi-FI" sz="1600" dirty="0"/>
+                <a:t>s</a:t>
+              </a:r>
+              <a:r>
+                <a:rPr lang="fi-FI" sz="1600" dirty="0" smtClean="0"/>
+                <a:t>end to verification</a:t>
+              </a:r>
+              <a:endParaRPr lang="fi-FI" sz="1600" dirty="0"/>
             </a:p>
           </p:txBody>
         </p:sp>
@@ -4241,8 +4273,8 @@
           </p:nvSpPr>
           <p:spPr>
             <a:xfrm>
-              <a:off x="2609961" y="6372475"/>
-              <a:ext cx="393029" cy="338554"/>
+              <a:off x="3060919" y="6381361"/>
+              <a:ext cx="2436492" cy="338554"/>
             </a:xfrm>
             <a:prstGeom prst="rect">
               <a:avLst/>
@@ -4257,7 +4289,19 @@
             <a:p>
               <a:r>
                 <a:rPr lang="en-GB" sz="1600" dirty="0" smtClean="0"/>
-                <a:t>6.</a:t>
+                <a:t>6</a:t>
+              </a:r>
+              <a:r>
+                <a:rPr lang="en-GB" sz="1600" dirty="0" smtClean="0"/>
+                <a:t>. if </a:t>
+              </a:r>
+              <a:r>
+                <a:rPr lang="en-GB" sz="1600" dirty="0"/>
+                <a:t>incorrect</a:t>
+              </a:r>
+              <a:r>
+                <a:rPr lang="en-GB" sz="1600" dirty="0" smtClean="0"/>
+                <a:t>, reject</a:t>
               </a:r>
               <a:endParaRPr lang="fi-FI" sz="1600" dirty="0"/>
             </a:p>
@@ -4271,8 +4315,8 @@
           </p:nvSpPr>
           <p:spPr>
             <a:xfrm>
-              <a:off x="4093393" y="5282091"/>
-              <a:ext cx="442380" cy="338554"/>
+              <a:off x="3998612" y="5378568"/>
+              <a:ext cx="1211741" cy="338554"/>
             </a:xfrm>
             <a:prstGeom prst="rect">
               <a:avLst/>
@@ -4287,7 +4331,11 @@
             <a:p>
               <a:r>
                 <a:rPr lang="fi-FI" sz="1600" dirty="0" smtClean="0"/>
-                <a:t>7.</a:t>
+                <a:t>7</a:t>
+              </a:r>
+              <a:r>
+                <a:rPr lang="fi-FI" sz="1600" dirty="0" smtClean="0"/>
+                <a:t>. if correct</a:t>
               </a:r>
               <a:endParaRPr lang="fi-FI" sz="1600" dirty="0"/>
             </a:p>
@@ -4305,7 +4353,7 @@
           <p:spPr>
             <a:xfrm flipV="1">
               <a:off x="4020318" y="5777634"/>
-              <a:ext cx="429881" cy="2865"/>
+              <a:ext cx="1068227" cy="2865"/>
             </a:xfrm>
             <a:prstGeom prst="bentConnector3">
               <a:avLst/>
@@ -4342,9 +4390,9 @@
             <p:nvPr/>
           </p:nvCxnSpPr>
           <p:spPr>
-            <a:xfrm flipV="1">
-              <a:off x="5419307" y="4786244"/>
-              <a:ext cx="129" cy="508687"/>
+            <a:xfrm flipH="1" flipV="1">
+              <a:off x="6048498" y="4636268"/>
+              <a:ext cx="9155" cy="658663"/>
             </a:xfrm>
             <a:prstGeom prst="straightConnector1">
               <a:avLst/>
@@ -4379,8 +4427,8 @@
           </p:nvSpPr>
           <p:spPr>
             <a:xfrm>
-              <a:off x="4373902" y="3530057"/>
-              <a:ext cx="2091067" cy="1256187"/>
+              <a:off x="5002964" y="3833771"/>
+              <a:ext cx="2091067" cy="802497"/>
             </a:xfrm>
             <a:prstGeom prst="rect">
               <a:avLst/>
@@ -4420,34 +4468,20 @@
             <a:p>
               <a:pPr algn="ctr"/>
               <a:r>
-                <a:rPr lang="fi-FI" sz="2000" dirty="0">
+                <a:rPr lang="fi-FI" sz="2000" dirty="0" smtClean="0">
                   <a:solidFill>
                     <a:schemeClr val="bg1"/>
                   </a:solidFill>
                 </a:rPr>
-                <a:t>BPF</a:t>
+                <a:t>BPF Program in </a:t>
               </a:r>
-            </a:p>
-            <a:p>
-              <a:pPr algn="ctr"/>
               <a:r>
                 <a:rPr lang="fi-FI" sz="2000" dirty="0">
                   <a:solidFill>
                     <a:schemeClr val="bg1"/>
                   </a:solidFill>
                 </a:rPr>
-                <a:t>Program</a:t>
-              </a:r>
-            </a:p>
-            <a:p>
-              <a:pPr algn="ctr"/>
-              <a:r>
-                <a:rPr lang="fi-FI" sz="2000" dirty="0">
-                  <a:solidFill>
-                    <a:schemeClr val="bg1"/>
-                  </a:solidFill>
-                </a:rPr>
-                <a:t>in Native  Assembly</a:t>
+                <a:t>Native  Assembly</a:t>
               </a:r>
             </a:p>
           </p:txBody>
@@ -4460,8 +4494,8 @@
           </p:nvSpPr>
           <p:spPr>
             <a:xfrm>
-              <a:off x="5497411" y="4835352"/>
-              <a:ext cx="415075" cy="338554"/>
+              <a:off x="6140888" y="4826761"/>
+              <a:ext cx="1177959" cy="338554"/>
             </a:xfrm>
             <a:prstGeom prst="rect">
               <a:avLst/>
@@ -4476,7 +4510,11 @@
             <a:p>
               <a:r>
                 <a:rPr lang="fi-FI" sz="1600" dirty="0" smtClean="0"/>
-                <a:t>8.</a:t>
+                <a:t>8</a:t>
+              </a:r>
+              <a:r>
+                <a:rPr lang="fi-FI" sz="1600" dirty="0" smtClean="0"/>
+                <a:t>. produce</a:t>
               </a:r>
               <a:endParaRPr lang="fi-FI" sz="1600" dirty="0"/>
             </a:p>

</xml_diff>